<commit_message>
Change review rating input to star rating
</commit_message>
<xml_diff>
--- a/src/main/webapp/image/star.pptx
+++ b/src/main/webapp/image/star.pptx
@@ -6,6 +6,7 @@
   </p:sldMasterIdLst>
   <p:sldIdLst>
     <p:sldId id="257" r:id="rId2"/>
+    <p:sldId id="258" r:id="rId3"/>
   </p:sldIdLst>
   <p:sldSz cx="12192000" cy="6858000"/>
   <p:notesSz cx="6858000" cy="9144000"/>
@@ -243,7 +244,7 @@
           <a:p>
             <a:fld id="{7595C72A-43C5-49B1-8A62-85D0BB4909E3}" type="datetimeFigureOut">
               <a:rPr lang="en-US" smtClean="0"/>
-              <a:t>7/4/2019</a:t>
+              <a:t>7/25/2019</a:t>
             </a:fld>
             <a:endParaRPr lang="en-US"/>
           </a:p>
@@ -413,7 +414,7 @@
           <a:p>
             <a:fld id="{7595C72A-43C5-49B1-8A62-85D0BB4909E3}" type="datetimeFigureOut">
               <a:rPr lang="en-US" smtClean="0"/>
-              <a:t>7/4/2019</a:t>
+              <a:t>7/25/2019</a:t>
             </a:fld>
             <a:endParaRPr lang="en-US"/>
           </a:p>
@@ -593,7 +594,7 @@
           <a:p>
             <a:fld id="{7595C72A-43C5-49B1-8A62-85D0BB4909E3}" type="datetimeFigureOut">
               <a:rPr lang="en-US" smtClean="0"/>
-              <a:t>7/4/2019</a:t>
+              <a:t>7/25/2019</a:t>
             </a:fld>
             <a:endParaRPr lang="en-US"/>
           </a:p>
@@ -763,7 +764,7 @@
           <a:p>
             <a:fld id="{7595C72A-43C5-49B1-8A62-85D0BB4909E3}" type="datetimeFigureOut">
               <a:rPr lang="en-US" smtClean="0"/>
-              <a:t>7/4/2019</a:t>
+              <a:t>7/25/2019</a:t>
             </a:fld>
             <a:endParaRPr lang="en-US"/>
           </a:p>
@@ -1009,7 +1010,7 @@
           <a:p>
             <a:fld id="{7595C72A-43C5-49B1-8A62-85D0BB4909E3}" type="datetimeFigureOut">
               <a:rPr lang="en-US" smtClean="0"/>
-              <a:t>7/4/2019</a:t>
+              <a:t>7/25/2019</a:t>
             </a:fld>
             <a:endParaRPr lang="en-US"/>
           </a:p>
@@ -1241,7 +1242,7 @@
           <a:p>
             <a:fld id="{7595C72A-43C5-49B1-8A62-85D0BB4909E3}" type="datetimeFigureOut">
               <a:rPr lang="en-US" smtClean="0"/>
-              <a:t>7/4/2019</a:t>
+              <a:t>7/25/2019</a:t>
             </a:fld>
             <a:endParaRPr lang="en-US"/>
           </a:p>
@@ -1608,7 +1609,7 @@
           <a:p>
             <a:fld id="{7595C72A-43C5-49B1-8A62-85D0BB4909E3}" type="datetimeFigureOut">
               <a:rPr lang="en-US" smtClean="0"/>
-              <a:t>7/4/2019</a:t>
+              <a:t>7/25/2019</a:t>
             </a:fld>
             <a:endParaRPr lang="en-US"/>
           </a:p>
@@ -1726,7 +1727,7 @@
           <a:p>
             <a:fld id="{7595C72A-43C5-49B1-8A62-85D0BB4909E3}" type="datetimeFigureOut">
               <a:rPr lang="en-US" smtClean="0"/>
-              <a:t>7/4/2019</a:t>
+              <a:t>7/25/2019</a:t>
             </a:fld>
             <a:endParaRPr lang="en-US"/>
           </a:p>
@@ -1821,7 +1822,7 @@
           <a:p>
             <a:fld id="{7595C72A-43C5-49B1-8A62-85D0BB4909E3}" type="datetimeFigureOut">
               <a:rPr lang="en-US" smtClean="0"/>
-              <a:t>7/4/2019</a:t>
+              <a:t>7/25/2019</a:t>
             </a:fld>
             <a:endParaRPr lang="en-US"/>
           </a:p>
@@ -2098,7 +2099,7 @@
           <a:p>
             <a:fld id="{7595C72A-43C5-49B1-8A62-85D0BB4909E3}" type="datetimeFigureOut">
               <a:rPr lang="en-US" smtClean="0"/>
-              <a:t>7/4/2019</a:t>
+              <a:t>7/25/2019</a:t>
             </a:fld>
             <a:endParaRPr lang="en-US"/>
           </a:p>
@@ -2351,7 +2352,7 @@
           <a:p>
             <a:fld id="{7595C72A-43C5-49B1-8A62-85D0BB4909E3}" type="datetimeFigureOut">
               <a:rPr lang="en-US" smtClean="0"/>
-              <a:t>7/4/2019</a:t>
+              <a:t>7/25/2019</a:t>
             </a:fld>
             <a:endParaRPr lang="en-US"/>
           </a:p>
@@ -2564,7 +2565,7 @@
           <a:p>
             <a:fld id="{7595C72A-43C5-49B1-8A62-85D0BB4909E3}" type="datetimeFigureOut">
               <a:rPr lang="en-US" smtClean="0"/>
-              <a:t>7/4/2019</a:t>
+              <a:t>7/25/2019</a:t>
             </a:fld>
             <a:endParaRPr lang="en-US"/>
           </a:p>
@@ -3237,6 +3238,189 @@
 </p:sld>
 </file>
 
+<file path=ppt/slides/slide2.xml><?xml version="1.0" encoding="utf-8"?>
+<p:sld xmlns:a="http://schemas.openxmlformats.org/drawingml/2006/main" xmlns:r="http://schemas.openxmlformats.org/officeDocument/2006/relationships" xmlns:p="http://schemas.openxmlformats.org/presentationml/2006/main">
+  <p:cSld>
+    <p:spTree>
+      <p:nvGrpSpPr>
+        <p:cNvPr id="1" name=""/>
+        <p:cNvGrpSpPr/>
+        <p:nvPr/>
+      </p:nvGrpSpPr>
+      <p:grpSpPr>
+        <a:xfrm>
+          <a:off x="0" y="0"/>
+          <a:ext cx="0" cy="0"/>
+          <a:chOff x="0" y="0"/>
+          <a:chExt cx="0" cy="0"/>
+        </a:xfrm>
+      </p:grpSpPr>
+      <p:sp>
+        <p:nvSpPr>
+          <p:cNvPr id="4" name="Round Same Side Corner Rectangle 3"/>
+          <p:cNvSpPr/>
+          <p:nvPr/>
+        </p:nvSpPr>
+        <p:spPr>
+          <a:xfrm>
+            <a:off x="5029200" y="3743837"/>
+            <a:ext cx="2057400" cy="881179"/>
+          </a:xfrm>
+          <a:prstGeom prst="round2SameRect">
+            <a:avLst>
+              <a:gd name="adj1" fmla="val 50000"/>
+              <a:gd name="adj2" fmla="val 0"/>
+            </a:avLst>
+          </a:prstGeom>
+          <a:solidFill>
+            <a:schemeClr val="bg1"/>
+          </a:solidFill>
+          <a:ln>
+            <a:noFill/>
+          </a:ln>
+        </p:spPr>
+        <p:style>
+          <a:lnRef idx="2">
+            <a:schemeClr val="accent1">
+              <a:shade val="50000"/>
+            </a:schemeClr>
+          </a:lnRef>
+          <a:fillRef idx="1">
+            <a:schemeClr val="accent1"/>
+          </a:fillRef>
+          <a:effectRef idx="0">
+            <a:schemeClr val="accent1"/>
+          </a:effectRef>
+          <a:fontRef idx="minor">
+            <a:schemeClr val="lt1"/>
+          </a:fontRef>
+        </p:style>
+        <p:txBody>
+          <a:bodyPr rtlCol="0" anchor="ctr"/>
+          <a:lstStyle/>
+          <a:p>
+            <a:pPr algn="ctr"/>
+            <a:endParaRPr lang="en-US"/>
+          </a:p>
+        </p:txBody>
+      </p:sp>
+      <p:sp>
+        <p:nvSpPr>
+          <p:cNvPr id="7" name="5-Point Star 6"/>
+          <p:cNvSpPr/>
+          <p:nvPr/>
+        </p:nvSpPr>
+        <p:spPr>
+          <a:xfrm>
+            <a:off x="239865" y="294166"/>
+            <a:ext cx="4330850" cy="4330850"/>
+          </a:xfrm>
+          <a:prstGeom prst="star5">
+            <a:avLst>
+              <a:gd name="adj" fmla="val 26003"/>
+              <a:gd name="hf" fmla="val 105146"/>
+              <a:gd name="vf" fmla="val 110557"/>
+            </a:avLst>
+          </a:prstGeom>
+          <a:solidFill>
+            <a:schemeClr val="accent2"/>
+          </a:solidFill>
+          <a:ln w="127000">
+            <a:solidFill>
+              <a:schemeClr val="accent2"/>
+            </a:solidFill>
+          </a:ln>
+        </p:spPr>
+        <p:style>
+          <a:lnRef idx="2">
+            <a:schemeClr val="accent1">
+              <a:shade val="50000"/>
+            </a:schemeClr>
+          </a:lnRef>
+          <a:fillRef idx="1">
+            <a:schemeClr val="accent1"/>
+          </a:fillRef>
+          <a:effectRef idx="0">
+            <a:schemeClr val="accent1"/>
+          </a:effectRef>
+          <a:fontRef idx="minor">
+            <a:schemeClr val="lt1"/>
+          </a:fontRef>
+        </p:style>
+        <p:txBody>
+          <a:bodyPr rtlCol="0" anchor="ctr"/>
+          <a:lstStyle/>
+          <a:p>
+            <a:pPr algn="ctr"/>
+            <a:endParaRPr lang="en-US"/>
+          </a:p>
+        </p:txBody>
+      </p:sp>
+      <p:sp>
+        <p:nvSpPr>
+          <p:cNvPr id="8" name="5-Point Star 7"/>
+          <p:cNvSpPr/>
+          <p:nvPr/>
+        </p:nvSpPr>
+        <p:spPr>
+          <a:xfrm>
+            <a:off x="7545085" y="268878"/>
+            <a:ext cx="4330850" cy="4330850"/>
+          </a:xfrm>
+          <a:prstGeom prst="star5">
+            <a:avLst>
+              <a:gd name="adj" fmla="val 26003"/>
+              <a:gd name="hf" fmla="val 105146"/>
+              <a:gd name="vf" fmla="val 110557"/>
+            </a:avLst>
+          </a:prstGeom>
+          <a:solidFill>
+            <a:schemeClr val="bg1"/>
+          </a:solidFill>
+          <a:ln w="190500">
+            <a:solidFill>
+              <a:schemeClr val="accent2"/>
+            </a:solidFill>
+          </a:ln>
+        </p:spPr>
+        <p:style>
+          <a:lnRef idx="2">
+            <a:schemeClr val="accent1">
+              <a:shade val="50000"/>
+            </a:schemeClr>
+          </a:lnRef>
+          <a:fillRef idx="1">
+            <a:schemeClr val="accent1"/>
+          </a:fillRef>
+          <a:effectRef idx="0">
+            <a:schemeClr val="accent1"/>
+          </a:effectRef>
+          <a:fontRef idx="minor">
+            <a:schemeClr val="lt1"/>
+          </a:fontRef>
+        </p:style>
+        <p:txBody>
+          <a:bodyPr rtlCol="0" anchor="ctr"/>
+          <a:lstStyle/>
+          <a:p>
+            <a:pPr algn="ctr"/>
+            <a:endParaRPr lang="en-US"/>
+          </a:p>
+        </p:txBody>
+      </p:sp>
+    </p:spTree>
+    <p:extLst>
+      <p:ext uri="{BB962C8B-B14F-4D97-AF65-F5344CB8AC3E}">
+        <p14:creationId xmlns:p14="http://schemas.microsoft.com/office/powerpoint/2010/main" val="567744550"/>
+      </p:ext>
+    </p:extLst>
+  </p:cSld>
+  <p:clrMapOvr>
+    <a:masterClrMapping/>
+  </p:clrMapOvr>
+</p:sld>
+</file>
+
 <file path=ppt/theme/theme1.xml><?xml version="1.0" encoding="utf-8"?>
 <a:theme xmlns:a="http://schemas.openxmlformats.org/drawingml/2006/main" name="Office Theme">
   <a:themeElements>

</xml_diff>

<commit_message>
Change review rating in book reviews to star rating
</commit_message>
<xml_diff>
--- a/src/main/webapp/image/star.pptx
+++ b/src/main/webapp/image/star.pptx
@@ -3135,9 +3135,7 @@
               <a:gd name="vf" fmla="val 110557"/>
             </a:avLst>
           </a:prstGeom>
-          <a:solidFill>
-            <a:schemeClr val="bg1"/>
-          </a:solidFill>
+          <a:noFill/>
           <a:ln w="190500">
             <a:solidFill>
               <a:srgbClr val="9B4DCA"/>
@@ -3374,9 +3372,7 @@
               <a:gd name="vf" fmla="val 110557"/>
             </a:avLst>
           </a:prstGeom>
-          <a:solidFill>
-            <a:schemeClr val="bg1"/>
-          </a:solidFill>
+          <a:noFill/>
           <a:ln w="190500">
             <a:solidFill>
               <a:schemeClr val="accent2"/>

</xml_diff>

<commit_message>
Change rating UI to stars in About Book and Review Feed (#45)
* Change review rating input to star rating

* Change review rating in book reviews to star rating

* Edit Review Feed UI
</commit_message>
<xml_diff>
--- a/src/main/webapp/image/star.pptx
+++ b/src/main/webapp/image/star.pptx
@@ -6,6 +6,7 @@
   </p:sldMasterIdLst>
   <p:sldIdLst>
     <p:sldId id="257" r:id="rId2"/>
+    <p:sldId id="258" r:id="rId3"/>
   </p:sldIdLst>
   <p:sldSz cx="12192000" cy="6858000"/>
   <p:notesSz cx="6858000" cy="9144000"/>
@@ -243,7 +244,7 @@
           <a:p>
             <a:fld id="{7595C72A-43C5-49B1-8A62-85D0BB4909E3}" type="datetimeFigureOut">
               <a:rPr lang="en-US" smtClean="0"/>
-              <a:t>7/4/2019</a:t>
+              <a:t>7/25/2019</a:t>
             </a:fld>
             <a:endParaRPr lang="en-US"/>
           </a:p>
@@ -413,7 +414,7 @@
           <a:p>
             <a:fld id="{7595C72A-43C5-49B1-8A62-85D0BB4909E3}" type="datetimeFigureOut">
               <a:rPr lang="en-US" smtClean="0"/>
-              <a:t>7/4/2019</a:t>
+              <a:t>7/25/2019</a:t>
             </a:fld>
             <a:endParaRPr lang="en-US"/>
           </a:p>
@@ -593,7 +594,7 @@
           <a:p>
             <a:fld id="{7595C72A-43C5-49B1-8A62-85D0BB4909E3}" type="datetimeFigureOut">
               <a:rPr lang="en-US" smtClean="0"/>
-              <a:t>7/4/2019</a:t>
+              <a:t>7/25/2019</a:t>
             </a:fld>
             <a:endParaRPr lang="en-US"/>
           </a:p>
@@ -763,7 +764,7 @@
           <a:p>
             <a:fld id="{7595C72A-43C5-49B1-8A62-85D0BB4909E3}" type="datetimeFigureOut">
               <a:rPr lang="en-US" smtClean="0"/>
-              <a:t>7/4/2019</a:t>
+              <a:t>7/25/2019</a:t>
             </a:fld>
             <a:endParaRPr lang="en-US"/>
           </a:p>
@@ -1009,7 +1010,7 @@
           <a:p>
             <a:fld id="{7595C72A-43C5-49B1-8A62-85D0BB4909E3}" type="datetimeFigureOut">
               <a:rPr lang="en-US" smtClean="0"/>
-              <a:t>7/4/2019</a:t>
+              <a:t>7/25/2019</a:t>
             </a:fld>
             <a:endParaRPr lang="en-US"/>
           </a:p>
@@ -1241,7 +1242,7 @@
           <a:p>
             <a:fld id="{7595C72A-43C5-49B1-8A62-85D0BB4909E3}" type="datetimeFigureOut">
               <a:rPr lang="en-US" smtClean="0"/>
-              <a:t>7/4/2019</a:t>
+              <a:t>7/25/2019</a:t>
             </a:fld>
             <a:endParaRPr lang="en-US"/>
           </a:p>
@@ -1608,7 +1609,7 @@
           <a:p>
             <a:fld id="{7595C72A-43C5-49B1-8A62-85D0BB4909E3}" type="datetimeFigureOut">
               <a:rPr lang="en-US" smtClean="0"/>
-              <a:t>7/4/2019</a:t>
+              <a:t>7/25/2019</a:t>
             </a:fld>
             <a:endParaRPr lang="en-US"/>
           </a:p>
@@ -1726,7 +1727,7 @@
           <a:p>
             <a:fld id="{7595C72A-43C5-49B1-8A62-85D0BB4909E3}" type="datetimeFigureOut">
               <a:rPr lang="en-US" smtClean="0"/>
-              <a:t>7/4/2019</a:t>
+              <a:t>7/25/2019</a:t>
             </a:fld>
             <a:endParaRPr lang="en-US"/>
           </a:p>
@@ -1821,7 +1822,7 @@
           <a:p>
             <a:fld id="{7595C72A-43C5-49B1-8A62-85D0BB4909E3}" type="datetimeFigureOut">
               <a:rPr lang="en-US" smtClean="0"/>
-              <a:t>7/4/2019</a:t>
+              <a:t>7/25/2019</a:t>
             </a:fld>
             <a:endParaRPr lang="en-US"/>
           </a:p>
@@ -2098,7 +2099,7 @@
           <a:p>
             <a:fld id="{7595C72A-43C5-49B1-8A62-85D0BB4909E3}" type="datetimeFigureOut">
               <a:rPr lang="en-US" smtClean="0"/>
-              <a:t>7/4/2019</a:t>
+              <a:t>7/25/2019</a:t>
             </a:fld>
             <a:endParaRPr lang="en-US"/>
           </a:p>
@@ -2351,7 +2352,7 @@
           <a:p>
             <a:fld id="{7595C72A-43C5-49B1-8A62-85D0BB4909E3}" type="datetimeFigureOut">
               <a:rPr lang="en-US" smtClean="0"/>
-              <a:t>7/4/2019</a:t>
+              <a:t>7/25/2019</a:t>
             </a:fld>
             <a:endParaRPr lang="en-US"/>
           </a:p>
@@ -2564,7 +2565,7 @@
           <a:p>
             <a:fld id="{7595C72A-43C5-49B1-8A62-85D0BB4909E3}" type="datetimeFigureOut">
               <a:rPr lang="en-US" smtClean="0"/>
-              <a:t>7/4/2019</a:t>
+              <a:t>7/25/2019</a:t>
             </a:fld>
             <a:endParaRPr lang="en-US"/>
           </a:p>
@@ -3134,9 +3135,7 @@
               <a:gd name="vf" fmla="val 110557"/>
             </a:avLst>
           </a:prstGeom>
-          <a:solidFill>
-            <a:schemeClr val="bg1"/>
-          </a:solidFill>
+          <a:noFill/>
           <a:ln w="190500">
             <a:solidFill>
               <a:srgbClr val="9B4DCA"/>
@@ -3228,6 +3227,187 @@
     <p:extLst>
       <p:ext uri="{BB962C8B-B14F-4D97-AF65-F5344CB8AC3E}">
         <p14:creationId xmlns:p14="http://schemas.microsoft.com/office/powerpoint/2010/main" val="232873658"/>
+      </p:ext>
+    </p:extLst>
+  </p:cSld>
+  <p:clrMapOvr>
+    <a:masterClrMapping/>
+  </p:clrMapOvr>
+</p:sld>
+</file>
+
+<file path=ppt/slides/slide2.xml><?xml version="1.0" encoding="utf-8"?>
+<p:sld xmlns:a="http://schemas.openxmlformats.org/drawingml/2006/main" xmlns:r="http://schemas.openxmlformats.org/officeDocument/2006/relationships" xmlns:p="http://schemas.openxmlformats.org/presentationml/2006/main">
+  <p:cSld>
+    <p:spTree>
+      <p:nvGrpSpPr>
+        <p:cNvPr id="1" name=""/>
+        <p:cNvGrpSpPr/>
+        <p:nvPr/>
+      </p:nvGrpSpPr>
+      <p:grpSpPr>
+        <a:xfrm>
+          <a:off x="0" y="0"/>
+          <a:ext cx="0" cy="0"/>
+          <a:chOff x="0" y="0"/>
+          <a:chExt cx="0" cy="0"/>
+        </a:xfrm>
+      </p:grpSpPr>
+      <p:sp>
+        <p:nvSpPr>
+          <p:cNvPr id="4" name="Round Same Side Corner Rectangle 3"/>
+          <p:cNvSpPr/>
+          <p:nvPr/>
+        </p:nvSpPr>
+        <p:spPr>
+          <a:xfrm>
+            <a:off x="5029200" y="3743837"/>
+            <a:ext cx="2057400" cy="881179"/>
+          </a:xfrm>
+          <a:prstGeom prst="round2SameRect">
+            <a:avLst>
+              <a:gd name="adj1" fmla="val 50000"/>
+              <a:gd name="adj2" fmla="val 0"/>
+            </a:avLst>
+          </a:prstGeom>
+          <a:solidFill>
+            <a:schemeClr val="bg1"/>
+          </a:solidFill>
+          <a:ln>
+            <a:noFill/>
+          </a:ln>
+        </p:spPr>
+        <p:style>
+          <a:lnRef idx="2">
+            <a:schemeClr val="accent1">
+              <a:shade val="50000"/>
+            </a:schemeClr>
+          </a:lnRef>
+          <a:fillRef idx="1">
+            <a:schemeClr val="accent1"/>
+          </a:fillRef>
+          <a:effectRef idx="0">
+            <a:schemeClr val="accent1"/>
+          </a:effectRef>
+          <a:fontRef idx="minor">
+            <a:schemeClr val="lt1"/>
+          </a:fontRef>
+        </p:style>
+        <p:txBody>
+          <a:bodyPr rtlCol="0" anchor="ctr"/>
+          <a:lstStyle/>
+          <a:p>
+            <a:pPr algn="ctr"/>
+            <a:endParaRPr lang="en-US"/>
+          </a:p>
+        </p:txBody>
+      </p:sp>
+      <p:sp>
+        <p:nvSpPr>
+          <p:cNvPr id="7" name="5-Point Star 6"/>
+          <p:cNvSpPr/>
+          <p:nvPr/>
+        </p:nvSpPr>
+        <p:spPr>
+          <a:xfrm>
+            <a:off x="239865" y="294166"/>
+            <a:ext cx="4330850" cy="4330850"/>
+          </a:xfrm>
+          <a:prstGeom prst="star5">
+            <a:avLst>
+              <a:gd name="adj" fmla="val 26003"/>
+              <a:gd name="hf" fmla="val 105146"/>
+              <a:gd name="vf" fmla="val 110557"/>
+            </a:avLst>
+          </a:prstGeom>
+          <a:solidFill>
+            <a:schemeClr val="accent2"/>
+          </a:solidFill>
+          <a:ln w="127000">
+            <a:solidFill>
+              <a:schemeClr val="accent2"/>
+            </a:solidFill>
+          </a:ln>
+        </p:spPr>
+        <p:style>
+          <a:lnRef idx="2">
+            <a:schemeClr val="accent1">
+              <a:shade val="50000"/>
+            </a:schemeClr>
+          </a:lnRef>
+          <a:fillRef idx="1">
+            <a:schemeClr val="accent1"/>
+          </a:fillRef>
+          <a:effectRef idx="0">
+            <a:schemeClr val="accent1"/>
+          </a:effectRef>
+          <a:fontRef idx="minor">
+            <a:schemeClr val="lt1"/>
+          </a:fontRef>
+        </p:style>
+        <p:txBody>
+          <a:bodyPr rtlCol="0" anchor="ctr"/>
+          <a:lstStyle/>
+          <a:p>
+            <a:pPr algn="ctr"/>
+            <a:endParaRPr lang="en-US"/>
+          </a:p>
+        </p:txBody>
+      </p:sp>
+      <p:sp>
+        <p:nvSpPr>
+          <p:cNvPr id="8" name="5-Point Star 7"/>
+          <p:cNvSpPr/>
+          <p:nvPr/>
+        </p:nvSpPr>
+        <p:spPr>
+          <a:xfrm>
+            <a:off x="7545085" y="268878"/>
+            <a:ext cx="4330850" cy="4330850"/>
+          </a:xfrm>
+          <a:prstGeom prst="star5">
+            <a:avLst>
+              <a:gd name="adj" fmla="val 26003"/>
+              <a:gd name="hf" fmla="val 105146"/>
+              <a:gd name="vf" fmla="val 110557"/>
+            </a:avLst>
+          </a:prstGeom>
+          <a:noFill/>
+          <a:ln w="190500">
+            <a:solidFill>
+              <a:schemeClr val="accent2"/>
+            </a:solidFill>
+          </a:ln>
+        </p:spPr>
+        <p:style>
+          <a:lnRef idx="2">
+            <a:schemeClr val="accent1">
+              <a:shade val="50000"/>
+            </a:schemeClr>
+          </a:lnRef>
+          <a:fillRef idx="1">
+            <a:schemeClr val="accent1"/>
+          </a:fillRef>
+          <a:effectRef idx="0">
+            <a:schemeClr val="accent1"/>
+          </a:effectRef>
+          <a:fontRef idx="minor">
+            <a:schemeClr val="lt1"/>
+          </a:fontRef>
+        </p:style>
+        <p:txBody>
+          <a:bodyPr rtlCol="0" anchor="ctr"/>
+          <a:lstStyle/>
+          <a:p>
+            <a:pPr algn="ctr"/>
+            <a:endParaRPr lang="en-US"/>
+          </a:p>
+        </p:txBody>
+      </p:sp>
+    </p:spTree>
+    <p:extLst>
+      <p:ext uri="{BB962C8B-B14F-4D97-AF65-F5344CB8AC3E}">
+        <p14:creationId xmlns:p14="http://schemas.microsoft.com/office/powerpoint/2010/main" val="567744550"/>
       </p:ext>
     </p:extLst>
   </p:cSld>

</xml_diff>